<commit_message>
Updated today's briefing and metrics spreadsheet after making edits while at work.
</commit_message>
<xml_diff>
--- a/doc/tunnelk Status - 2012-02-23.pptx
+++ b/doc/tunnelk Status - 2012-02-23.pptx
@@ -5,10 +5,10 @@
     <p:sldMasterId id="2147483648" r:id="rId1"/>
   </p:sldMasterIdLst>
   <p:notesMasterIdLst>
-    <p:notesMasterId r:id="rId8"/>
+    <p:notesMasterId r:id="rId9"/>
   </p:notesMasterIdLst>
   <p:handoutMasterIdLst>
-    <p:handoutMasterId r:id="rId9"/>
+    <p:handoutMasterId r:id="rId10"/>
   </p:handoutMasterIdLst>
   <p:sldIdLst>
     <p:sldId id="256" r:id="rId2"/>
@@ -16,7 +16,8 @@
     <p:sldId id="264" r:id="rId4"/>
     <p:sldId id="263" r:id="rId5"/>
     <p:sldId id="265" r:id="rId6"/>
-    <p:sldId id="266" r:id="rId7"/>
+    <p:sldId id="267" r:id="rId7"/>
+    <p:sldId id="266" r:id="rId8"/>
   </p:sldIdLst>
   <p:sldSz cx="9144000" cy="6858000" type="screen4x3"/>
   <p:notesSz cx="6858000" cy="9144000"/>
@@ -151,10 +152,10 @@
           </c:marker>
           <c:cat>
             <c:numRef>
-              <c:f>Sheet1!$B$1:$F$1</c:f>
+              <c:f>Sheet1!$B$1:$G$1</c:f>
               <c:numCache>
-                <c:formatCode>m/d/yy</c:formatCode>
-                <c:ptCount val="5"/>
+                <c:formatCode>m/d/yyyy</c:formatCode>
+                <c:ptCount val="6"/>
                 <c:pt idx="0">
                   <c:v>40927</c:v>
                 </c:pt>
@@ -169,16 +170,19 @@
                 </c:pt>
                 <c:pt idx="4">
                   <c:v>40955</c:v>
+                </c:pt>
+                <c:pt idx="5">
+                  <c:v>40962</c:v>
                 </c:pt>
               </c:numCache>
             </c:numRef>
           </c:cat>
           <c:val>
             <c:numRef>
-              <c:f>Sheet1!$B$2:$F$2</c:f>
+              <c:f>Sheet1!$B$2:$G$2</c:f>
               <c:numCache>
                 <c:formatCode>General</c:formatCode>
-                <c:ptCount val="5"/>
+                <c:ptCount val="6"/>
                 <c:pt idx="0">
                   <c:v>5</c:v>
                 </c:pt>
@@ -193,6 +197,9 @@
                 </c:pt>
                 <c:pt idx="4">
                   <c:v>5</c:v>
+                </c:pt>
+                <c:pt idx="5">
+                  <c:v>116</c:v>
                 </c:pt>
               </c:numCache>
             </c:numRef>
@@ -217,10 +224,10 @@
           </c:marker>
           <c:cat>
             <c:numRef>
-              <c:f>Sheet1!$B$1:$F$1</c:f>
+              <c:f>Sheet1!$B$1:$G$1</c:f>
               <c:numCache>
-                <c:formatCode>m/d/yy</c:formatCode>
-                <c:ptCount val="5"/>
+                <c:formatCode>m/d/yyyy</c:formatCode>
+                <c:ptCount val="6"/>
                 <c:pt idx="0">
                   <c:v>40927</c:v>
                 </c:pt>
@@ -235,16 +242,19 @@
                 </c:pt>
                 <c:pt idx="4">
                   <c:v>40955</c:v>
+                </c:pt>
+                <c:pt idx="5">
+                  <c:v>40962</c:v>
                 </c:pt>
               </c:numCache>
             </c:numRef>
           </c:cat>
           <c:val>
             <c:numRef>
-              <c:f>Sheet1!$B$3:$F$3</c:f>
+              <c:f>Sheet1!$B$3:$G$3</c:f>
               <c:numCache>
                 <c:formatCode>General</c:formatCode>
-                <c:ptCount val="5"/>
+                <c:ptCount val="6"/>
                 <c:pt idx="0">
                   <c:v>0</c:v>
                 </c:pt>
@@ -258,6 +268,9 @@
                   <c:v>0</c:v>
                 </c:pt>
                 <c:pt idx="4">
+                  <c:v>0</c:v>
+                </c:pt>
+                <c:pt idx="5">
                   <c:v>0</c:v>
                 </c:pt>
               </c:numCache>
@@ -283,10 +296,10 @@
           </c:marker>
           <c:cat>
             <c:numRef>
-              <c:f>Sheet1!$B$1:$F$1</c:f>
+              <c:f>Sheet1!$B$1:$G$1</c:f>
               <c:numCache>
-                <c:formatCode>m/d/yy</c:formatCode>
-                <c:ptCount val="5"/>
+                <c:formatCode>m/d/yyyy</c:formatCode>
+                <c:ptCount val="6"/>
                 <c:pt idx="0">
                   <c:v>40927</c:v>
                 </c:pt>
@@ -301,16 +314,19 @@
                 </c:pt>
                 <c:pt idx="4">
                   <c:v>40955</c:v>
+                </c:pt>
+                <c:pt idx="5">
+                  <c:v>40962</c:v>
                 </c:pt>
               </c:numCache>
             </c:numRef>
           </c:cat>
           <c:val>
             <c:numRef>
-              <c:f>Sheet1!$B$4:$F$4</c:f>
+              <c:f>Sheet1!$B$4:$G$4</c:f>
               <c:numCache>
                 <c:formatCode>General</c:formatCode>
-                <c:ptCount val="5"/>
+                <c:ptCount val="6"/>
                 <c:pt idx="0">
                   <c:v>47</c:v>
                 </c:pt>
@@ -325,6 +341,9 @@
                 </c:pt>
                 <c:pt idx="4">
                   <c:v>47</c:v>
+                </c:pt>
+                <c:pt idx="5">
+                  <c:v>158</c:v>
                 </c:pt>
               </c:numCache>
             </c:numRef>
@@ -349,10 +368,10 @@
           </c:marker>
           <c:cat>
             <c:numRef>
-              <c:f>Sheet1!$B$1:$F$1</c:f>
+              <c:f>Sheet1!$B$1:$G$1</c:f>
               <c:numCache>
-                <c:formatCode>m/d/yy</c:formatCode>
-                <c:ptCount val="5"/>
+                <c:formatCode>m/d/yyyy</c:formatCode>
+                <c:ptCount val="6"/>
                 <c:pt idx="0">
                   <c:v>40927</c:v>
                 </c:pt>
@@ -367,16 +386,19 @@
                 </c:pt>
                 <c:pt idx="4">
                   <c:v>40955</c:v>
+                </c:pt>
+                <c:pt idx="5">
+                  <c:v>40962</c:v>
                 </c:pt>
               </c:numCache>
             </c:numRef>
           </c:cat>
           <c:val>
             <c:numRef>
-              <c:f>Sheet1!$B$5:$F$5</c:f>
+              <c:f>Sheet1!$B$5:$G$5</c:f>
               <c:numCache>
                 <c:formatCode>General</c:formatCode>
-                <c:ptCount val="5"/>
+                <c:ptCount val="6"/>
                 <c:pt idx="0">
                   <c:v>70</c:v>
                 </c:pt>
@@ -391,25 +413,27 @@
                 </c:pt>
                 <c:pt idx="4">
                   <c:v>101</c:v>
+                </c:pt>
+                <c:pt idx="5">
+                  <c:v>107</c:v>
                 </c:pt>
               </c:numCache>
             </c:numRef>
           </c:val>
         </c:ser>
-        <c:dLbls/>
         <c:marker val="1"/>
-        <c:axId val="47459712"/>
-        <c:axId val="47490176"/>
+        <c:axId val="37759616"/>
+        <c:axId val="37765888"/>
       </c:lineChart>
       <c:dateAx>
-        <c:axId val="47459712"/>
+        <c:axId val="37759616"/>
         <c:scaling>
           <c:orientation val="minMax"/>
         </c:scaling>
         <c:axPos val="b"/>
-        <c:numFmt formatCode="m/d/yy" sourceLinked="1"/>
+        <c:numFmt formatCode="m/d/yyyy" sourceLinked="1"/>
         <c:tickLblPos val="nextTo"/>
-        <c:crossAx val="47490176"/>
+        <c:crossAx val="37765888"/>
         <c:crosses val="autoZero"/>
         <c:auto val="1"/>
         <c:lblOffset val="100"/>
@@ -418,7 +442,7 @@
         <c:majorTimeUnit val="days"/>
       </c:dateAx>
       <c:valAx>
-        <c:axId val="47490176"/>
+        <c:axId val="37765888"/>
         <c:scaling>
           <c:orientation val="minMax"/>
         </c:scaling>
@@ -426,7 +450,7 @@
         <c:majorGridlines/>
         <c:numFmt formatCode="General" sourceLinked="1"/>
         <c:tickLblPos val="nextTo"/>
-        <c:crossAx val="47459712"/>
+        <c:crossAx val="37759616"/>
         <c:crosses val="autoZero"/>
         <c:crossBetween val="between"/>
       </c:valAx>
@@ -437,10 +461,10 @@
         <c:manualLayout>
           <c:xMode val="edge"/>
           <c:yMode val="edge"/>
-          <c:x val="0.66823091247672317"/>
-          <c:y val="4.3679125262180617E-2"/>
-          <c:w val="0.30569832402234604"/>
-          <c:h val="0.90681933317287311"/>
+          <c:x val="0.66823091247672373"/>
+          <c:y val="4.3679125262180561E-2"/>
+          <c:w val="0.3056983240223462"/>
+          <c:h val="0.90681933317287344"/>
         </c:manualLayout>
       </c:layout>
     </c:legend>
@@ -478,10 +502,10 @@
           </c:marker>
           <c:cat>
             <c:numRef>
-              <c:f>Sheet1!$B$7:$F$7</c:f>
+              <c:f>Sheet1!$B$7:$G$7</c:f>
               <c:numCache>
-                <c:formatCode>m/d/yy</c:formatCode>
-                <c:ptCount val="5"/>
+                <c:formatCode>m/d/yyyy</c:formatCode>
+                <c:ptCount val="6"/>
                 <c:pt idx="0">
                   <c:v>40927</c:v>
                 </c:pt>
@@ -496,16 +520,19 @@
                 </c:pt>
                 <c:pt idx="4">
                   <c:v>40955</c:v>
+                </c:pt>
+                <c:pt idx="5">
+                  <c:v>40962</c:v>
                 </c:pt>
               </c:numCache>
             </c:numRef>
           </c:cat>
           <c:val>
             <c:numRef>
-              <c:f>Sheet1!$B$8:$F$8</c:f>
+              <c:f>Sheet1!$B$8:$G$8</c:f>
               <c:numCache>
                 <c:formatCode>General</c:formatCode>
-                <c:ptCount val="5"/>
+                <c:ptCount val="6"/>
                 <c:pt idx="2">
                   <c:v>8825</c:v>
                 </c:pt>
@@ -513,6 +540,9 @@
                   <c:v>9092</c:v>
                 </c:pt>
                 <c:pt idx="4">
+                  <c:v>9574</c:v>
+                </c:pt>
+                <c:pt idx="5">
                   <c:v>9574</c:v>
                 </c:pt>
               </c:numCache>
@@ -538,10 +568,10 @@
           </c:marker>
           <c:cat>
             <c:numRef>
-              <c:f>Sheet1!$B$7:$F$7</c:f>
+              <c:f>Sheet1!$B$7:$G$7</c:f>
               <c:numCache>
-                <c:formatCode>m/d/yy</c:formatCode>
-                <c:ptCount val="5"/>
+                <c:formatCode>m/d/yyyy</c:formatCode>
+                <c:ptCount val="6"/>
                 <c:pt idx="0">
                   <c:v>40927</c:v>
                 </c:pt>
@@ -556,16 +586,19 @@
                 </c:pt>
                 <c:pt idx="4">
                   <c:v>40955</c:v>
+                </c:pt>
+                <c:pt idx="5">
+                  <c:v>40962</c:v>
                 </c:pt>
               </c:numCache>
             </c:numRef>
           </c:cat>
           <c:val>
             <c:numRef>
-              <c:f>Sheet1!$B$9:$F$9</c:f>
+              <c:f>Sheet1!$B$9:$G$9</c:f>
               <c:numCache>
                 <c:formatCode>General</c:formatCode>
-                <c:ptCount val="5"/>
+                <c:ptCount val="6"/>
                 <c:pt idx="2">
                   <c:v>6499</c:v>
                 </c:pt>
@@ -573,24 +606,26 @@
                   <c:v>6693</c:v>
                 </c:pt>
                 <c:pt idx="4">
+                  <c:v>7025</c:v>
+                </c:pt>
+                <c:pt idx="5">
                   <c:v>7025</c:v>
                 </c:pt>
               </c:numCache>
             </c:numRef>
           </c:val>
         </c:ser>
-        <c:dLbls/>
         <c:marker val="1"/>
-        <c:axId val="47849472"/>
-        <c:axId val="47851008"/>
+        <c:axId val="63922176"/>
+        <c:axId val="63923712"/>
       </c:lineChart>
       <c:dateAx>
-        <c:axId val="47849472"/>
+        <c:axId val="63922176"/>
         <c:scaling>
           <c:orientation val="minMax"/>
         </c:scaling>
         <c:axPos val="b"/>
-        <c:numFmt formatCode="m/d/yy" sourceLinked="1"/>
+        <c:numFmt formatCode="m/d/yyyy" sourceLinked="1"/>
         <c:tickLblPos val="nextTo"/>
         <c:txPr>
           <a:bodyPr rot="-2700000"/>
@@ -602,7 +637,7 @@
             <a:endParaRPr lang="en-US"/>
           </a:p>
         </c:txPr>
-        <c:crossAx val="47851008"/>
+        <c:crossAx val="63923712"/>
         <c:crosses val="autoZero"/>
         <c:auto val="1"/>
         <c:lblOffset val="100"/>
@@ -611,16 +646,15 @@
         <c:majorTimeUnit val="days"/>
       </c:dateAx>
       <c:valAx>
-        <c:axId val="47851008"/>
+        <c:axId val="63923712"/>
         <c:scaling>
           <c:orientation val="minMax"/>
-          <c:min val="6000"/>
         </c:scaling>
         <c:axPos val="l"/>
         <c:majorGridlines/>
         <c:numFmt formatCode="General" sourceLinked="1"/>
         <c:tickLblPos val="nextTo"/>
-        <c:crossAx val="47849472"/>
+        <c:crossAx val="63922176"/>
         <c:crosses val="autoZero"/>
         <c:crossBetween val="between"/>
       </c:valAx>
@@ -666,10 +700,10 @@
           </c:marker>
           <c:cat>
             <c:numRef>
-              <c:f>Sheet1!$B$7:$F$7</c:f>
+              <c:f>Sheet1!$B$7:$G$7</c:f>
               <c:numCache>
-                <c:formatCode>m/d/yy</c:formatCode>
-                <c:ptCount val="5"/>
+                <c:formatCode>m/d/yyyy</c:formatCode>
+                <c:ptCount val="6"/>
                 <c:pt idx="0">
                   <c:v>40927</c:v>
                 </c:pt>
@@ -684,16 +718,19 @@
                 </c:pt>
                 <c:pt idx="4">
                   <c:v>40955</c:v>
+                </c:pt>
+                <c:pt idx="5">
+                  <c:v>40962</c:v>
                 </c:pt>
               </c:numCache>
             </c:numRef>
           </c:cat>
           <c:val>
             <c:numRef>
-              <c:f>Sheet1!$B$11:$F$11</c:f>
+              <c:f>Sheet1!$B$11:$G$11</c:f>
               <c:numCache>
                 <c:formatCode>General</c:formatCode>
-                <c:ptCount val="5"/>
+                <c:ptCount val="6"/>
                 <c:pt idx="0">
                   <c:v>85</c:v>
                 </c:pt>
@@ -708,25 +745,27 @@
                 </c:pt>
                 <c:pt idx="4">
                   <c:v>107</c:v>
+                </c:pt>
+                <c:pt idx="5">
+                  <c:v>112</c:v>
                 </c:pt>
               </c:numCache>
             </c:numRef>
           </c:val>
         </c:ser>
-        <c:dLbls/>
         <c:marker val="1"/>
-        <c:axId val="47878144"/>
-        <c:axId val="47879680"/>
+        <c:axId val="102312960"/>
+        <c:axId val="38374784"/>
       </c:lineChart>
       <c:dateAx>
-        <c:axId val="47878144"/>
+        <c:axId val="102312960"/>
         <c:scaling>
           <c:orientation val="minMax"/>
         </c:scaling>
         <c:axPos val="b"/>
-        <c:numFmt formatCode="m/d/yy" sourceLinked="1"/>
+        <c:numFmt formatCode="m/d/yyyy" sourceLinked="1"/>
         <c:tickLblPos val="nextTo"/>
-        <c:crossAx val="47879680"/>
+        <c:crossAx val="38374784"/>
         <c:crosses val="autoZero"/>
         <c:auto val="1"/>
         <c:lblOffset val="100"/>
@@ -735,7 +774,7 @@
         <c:majorTimeUnit val="days"/>
       </c:dateAx>
       <c:valAx>
-        <c:axId val="47879680"/>
+        <c:axId val="38374784"/>
         <c:scaling>
           <c:orientation val="minMax"/>
           <c:min val="80"/>
@@ -744,7 +783,7 @@
         <c:majorGridlines/>
         <c:numFmt formatCode="General" sourceLinked="1"/>
         <c:tickLblPos val="nextTo"/>
-        <c:crossAx val="47878144"/>
+        <c:crossAx val="102312960"/>
         <c:crosses val="autoZero"/>
         <c:crossBetween val="between"/>
       </c:valAx>
@@ -787,10 +826,10 @@
           </c:marker>
           <c:cat>
             <c:numRef>
-              <c:f>Sheet1!$B$13:$F$13</c:f>
+              <c:f>Sheet1!$B$13:$G$13</c:f>
               <c:numCache>
-                <c:formatCode>m/d/yy</c:formatCode>
-                <c:ptCount val="5"/>
+                <c:formatCode>m/d/yyyy</c:formatCode>
+                <c:ptCount val="6"/>
                 <c:pt idx="0">
                   <c:v>40927</c:v>
                 </c:pt>
@@ -805,16 +844,19 @@
                 </c:pt>
                 <c:pt idx="4">
                   <c:v>40955</c:v>
+                </c:pt>
+                <c:pt idx="5">
+                  <c:v>40962</c:v>
                 </c:pt>
               </c:numCache>
             </c:numRef>
           </c:cat>
           <c:val>
             <c:numRef>
-              <c:f>Sheet1!$B$14:$F$14</c:f>
+              <c:f>Sheet1!$B$14:$G$14</c:f>
               <c:numCache>
                 <c:formatCode>General</c:formatCode>
-                <c:ptCount val="5"/>
+                <c:ptCount val="6"/>
                 <c:pt idx="0">
                   <c:v>3</c:v>
                 </c:pt>
@@ -828,6 +870,9 @@
                   <c:v>3</c:v>
                 </c:pt>
                 <c:pt idx="4">
+                  <c:v>3</c:v>
+                </c:pt>
+                <c:pt idx="5">
                   <c:v>3</c:v>
                 </c:pt>
               </c:numCache>
@@ -853,10 +898,10 @@
           </c:marker>
           <c:cat>
             <c:numRef>
-              <c:f>Sheet1!$B$13:$F$13</c:f>
+              <c:f>Sheet1!$B$13:$G$13</c:f>
               <c:numCache>
-                <c:formatCode>m/d/yy</c:formatCode>
-                <c:ptCount val="5"/>
+                <c:formatCode>m/d/yyyy</c:formatCode>
+                <c:ptCount val="6"/>
                 <c:pt idx="0">
                   <c:v>40927</c:v>
                 </c:pt>
@@ -871,16 +916,19 @@
                 </c:pt>
                 <c:pt idx="4">
                   <c:v>40955</c:v>
+                </c:pt>
+                <c:pt idx="5">
+                  <c:v>40962</c:v>
                 </c:pt>
               </c:numCache>
             </c:numRef>
           </c:cat>
           <c:val>
             <c:numRef>
-              <c:f>Sheet1!$B$15:$F$15</c:f>
+              <c:f>Sheet1!$B$15:$G$15</c:f>
               <c:numCache>
                 <c:formatCode>General</c:formatCode>
-                <c:ptCount val="5"/>
+                <c:ptCount val="6"/>
                 <c:pt idx="0">
                   <c:v>0</c:v>
                 </c:pt>
@@ -895,6 +943,9 @@
                 </c:pt>
                 <c:pt idx="4">
                   <c:v>1</c:v>
+                </c:pt>
+                <c:pt idx="5">
+                  <c:v>2</c:v>
                 </c:pt>
               </c:numCache>
             </c:numRef>
@@ -919,10 +970,10 @@
           </c:marker>
           <c:cat>
             <c:numRef>
-              <c:f>Sheet1!$B$13:$F$13</c:f>
+              <c:f>Sheet1!$B$13:$G$13</c:f>
               <c:numCache>
-                <c:formatCode>m/d/yy</c:formatCode>
-                <c:ptCount val="5"/>
+                <c:formatCode>m/d/yyyy</c:formatCode>
+                <c:ptCount val="6"/>
                 <c:pt idx="0">
                   <c:v>40927</c:v>
                 </c:pt>
@@ -937,16 +988,19 @@
                 </c:pt>
                 <c:pt idx="4">
                   <c:v>40955</c:v>
+                </c:pt>
+                <c:pt idx="5">
+                  <c:v>40962</c:v>
                 </c:pt>
               </c:numCache>
             </c:numRef>
           </c:cat>
           <c:val>
             <c:numRef>
-              <c:f>Sheet1!$B$16:$F$16</c:f>
+              <c:f>Sheet1!$B$16:$G$16</c:f>
               <c:numCache>
                 <c:formatCode>General</c:formatCode>
-                <c:ptCount val="5"/>
+                <c:ptCount val="6"/>
                 <c:pt idx="0">
                   <c:v>0</c:v>
                 </c:pt>
@@ -960,6 +1014,9 @@
                   <c:v>1</c:v>
                 </c:pt>
                 <c:pt idx="4">
+                  <c:v>1</c:v>
+                </c:pt>
+                <c:pt idx="5">
                   <c:v>1</c:v>
                 </c:pt>
               </c:numCache>
@@ -985,10 +1042,10 @@
           </c:marker>
           <c:cat>
             <c:numRef>
-              <c:f>Sheet1!$B$13:$F$13</c:f>
+              <c:f>Sheet1!$B$13:$G$13</c:f>
               <c:numCache>
-                <c:formatCode>m/d/yy</c:formatCode>
-                <c:ptCount val="5"/>
+                <c:formatCode>m/d/yyyy</c:formatCode>
+                <c:ptCount val="6"/>
                 <c:pt idx="0">
                   <c:v>40927</c:v>
                 </c:pt>
@@ -1003,16 +1060,19 @@
                 </c:pt>
                 <c:pt idx="4">
                   <c:v>40955</c:v>
+                </c:pt>
+                <c:pt idx="5">
+                  <c:v>40962</c:v>
                 </c:pt>
               </c:numCache>
             </c:numRef>
           </c:cat>
           <c:val>
             <c:numRef>
-              <c:f>Sheet1!$B$17:$F$17</c:f>
+              <c:f>Sheet1!$B$17:$G$17</c:f>
               <c:numCache>
                 <c:formatCode>General</c:formatCode>
-                <c:ptCount val="5"/>
+                <c:ptCount val="6"/>
                 <c:pt idx="0">
                   <c:v>0</c:v>
                 </c:pt>
@@ -1026,26 +1086,28 @@
                   <c:v>1</c:v>
                 </c:pt>
                 <c:pt idx="4">
+                  <c:v>1</c:v>
+                </c:pt>
+                <c:pt idx="5">
                   <c:v>1</c:v>
                 </c:pt>
               </c:numCache>
             </c:numRef>
           </c:val>
         </c:ser>
-        <c:dLbls/>
         <c:marker val="1"/>
-        <c:axId val="49862912"/>
-        <c:axId val="49868800"/>
+        <c:axId val="37840000"/>
+        <c:axId val="38015360"/>
       </c:lineChart>
       <c:dateAx>
-        <c:axId val="49862912"/>
+        <c:axId val="37840000"/>
         <c:scaling>
           <c:orientation val="minMax"/>
         </c:scaling>
         <c:axPos val="b"/>
-        <c:numFmt formatCode="m/d/yy" sourceLinked="1"/>
+        <c:numFmt formatCode="m/d/yyyy" sourceLinked="1"/>
         <c:tickLblPos val="nextTo"/>
-        <c:crossAx val="49868800"/>
+        <c:crossAx val="38015360"/>
         <c:crosses val="autoZero"/>
         <c:auto val="1"/>
         <c:lblOffset val="100"/>
@@ -1054,7 +1116,7 @@
         <c:majorTimeUnit val="days"/>
       </c:dateAx>
       <c:valAx>
-        <c:axId val="49868800"/>
+        <c:axId val="38015360"/>
         <c:scaling>
           <c:orientation val="minMax"/>
         </c:scaling>
@@ -1062,7 +1124,7 @@
         <c:majorGridlines/>
         <c:numFmt formatCode="General" sourceLinked="1"/>
         <c:tickLblPos val="nextTo"/>
-        <c:crossAx val="49862912"/>
+        <c:crossAx val="37840000"/>
         <c:crosses val="autoZero"/>
         <c:crossBetween val="between"/>
       </c:valAx>
@@ -1073,10 +1135,10 @@
         <c:manualLayout>
           <c:xMode val="edge"/>
           <c:yMode val="edge"/>
-          <c:x val="0.69662962962963015"/>
+          <c:x val="0.69662962962963071"/>
           <c:y val="6.1146374170477601E-2"/>
-          <c:w val="0.28114814814814798"/>
-          <c:h val="0.86898463019633509"/>
+          <c:w val="0.28114814814814781"/>
+          <c:h val="0.86898463019633543"/>
         </c:manualLayout>
       </c:layout>
     </c:legend>
@@ -1170,7 +1232,7 @@
             <a:fld id="{C112A329-A621-46CF-9879-55386638107A}" type="datetimeFigureOut">
               <a:rPr lang="en-US" smtClean="0"/>
               <a:pPr/>
-              <a:t>2/22/2012</a:t>
+              <a:t>2/23/2012</a:t>
             </a:fld>
             <a:endParaRPr lang="en-US"/>
           </a:p>
@@ -1337,7 +1399,7 @@
             <a:fld id="{BD60C36C-12F0-7C4E-92CA-6378FCE84C25}" type="datetimeFigureOut">
               <a:rPr lang="en-US" smtClean="0"/>
               <a:pPr/>
-              <a:t>2/22/2012</a:t>
+              <a:t>2/23/2012</a:t>
             </a:fld>
             <a:endParaRPr lang="en-US"/>
           </a:p>
@@ -1847,7 +1909,7 @@
             <a:fld id="{771D59A8-134A-704F-A93D-2B943B1F389E}" type="slidenum">
               <a:rPr lang="en-US" smtClean="0"/>
               <a:pPr/>
-              <a:t>6</a:t>
+              <a:t>7</a:t>
             </a:fld>
             <a:endParaRPr lang="en-US"/>
           </a:p>
@@ -2048,7 +2110,7 @@
             <a:fld id="{139B3C01-E862-4DB4-BCEC-DF1E3BE1BC60}" type="datetime1">
               <a:rPr lang="en-US" smtClean="0"/>
               <a:pPr/>
-              <a:t>2/22/2012</a:t>
+              <a:t>2/23/2012</a:t>
             </a:fld>
             <a:endParaRPr lang="en-US"/>
           </a:p>
@@ -2215,7 +2277,7 @@
             <a:fld id="{547F92B4-6920-47BB-99E2-8578B712FA0E}" type="datetime1">
               <a:rPr lang="en-US" smtClean="0"/>
               <a:pPr/>
-              <a:t>2/22/2012</a:t>
+              <a:t>2/23/2012</a:t>
             </a:fld>
             <a:endParaRPr lang="en-US"/>
           </a:p>
@@ -2392,7 +2454,7 @@
             <a:fld id="{32CFDD96-6602-48F6-B49B-95CBB161E9FF}" type="datetime1">
               <a:rPr lang="en-US" smtClean="0"/>
               <a:pPr/>
-              <a:t>2/22/2012</a:t>
+              <a:t>2/23/2012</a:t>
             </a:fld>
             <a:endParaRPr lang="en-US"/>
           </a:p>
@@ -2559,7 +2621,7 @@
             <a:fld id="{F42C77AB-5BB1-4513-B9EC-D724674E8083}" type="datetime1">
               <a:rPr lang="en-US" smtClean="0"/>
               <a:pPr/>
-              <a:t>2/22/2012</a:t>
+              <a:t>2/23/2012</a:t>
             </a:fld>
             <a:endParaRPr lang="en-US"/>
           </a:p>
@@ -2802,7 +2864,7 @@
             <a:fld id="{C0622839-A52D-4035-9073-66B9206EBAEE}" type="datetime1">
               <a:rPr lang="en-US" smtClean="0"/>
               <a:pPr/>
-              <a:t>2/22/2012</a:t>
+              <a:t>2/23/2012</a:t>
             </a:fld>
             <a:endParaRPr lang="en-US"/>
           </a:p>
@@ -3087,7 +3149,7 @@
             <a:fld id="{C96ECEE5-E6EF-402F-9B28-2AFF8B459D04}" type="datetime1">
               <a:rPr lang="en-US" smtClean="0"/>
               <a:pPr/>
-              <a:t>2/22/2012</a:t>
+              <a:t>2/23/2012</a:t>
             </a:fld>
             <a:endParaRPr lang="en-US"/>
           </a:p>
@@ -3506,7 +3568,7 @@
             <a:fld id="{3DC265E6-4252-48E7-A7BE-337D91BBA0AF}" type="datetime1">
               <a:rPr lang="en-US" smtClean="0"/>
               <a:pPr/>
-              <a:t>2/22/2012</a:t>
+              <a:t>2/23/2012</a:t>
             </a:fld>
             <a:endParaRPr lang="en-US"/>
           </a:p>
@@ -3621,7 +3683,7 @@
             <a:fld id="{86D570BA-06C8-4A33-99F8-722C15CBE3B1}" type="datetime1">
               <a:rPr lang="en-US" smtClean="0"/>
               <a:pPr/>
-              <a:t>2/22/2012</a:t>
+              <a:t>2/23/2012</a:t>
             </a:fld>
             <a:endParaRPr lang="en-US"/>
           </a:p>
@@ -3713,7 +3775,7 @@
             <a:fld id="{C255B55A-6D97-4412-98D3-AB1F983BF2AD}" type="datetime1">
               <a:rPr lang="en-US" smtClean="0"/>
               <a:pPr/>
-              <a:t>2/22/2012</a:t>
+              <a:t>2/23/2012</a:t>
             </a:fld>
             <a:endParaRPr lang="en-US"/>
           </a:p>
@@ -3987,7 +4049,7 @@
             <a:fld id="{6401D403-EA04-4E1D-A2D0-418AC0CCAC24}" type="datetime1">
               <a:rPr lang="en-US" smtClean="0"/>
               <a:pPr/>
-              <a:t>2/22/2012</a:t>
+              <a:t>2/23/2012</a:t>
             </a:fld>
             <a:endParaRPr lang="en-US"/>
           </a:p>
@@ -4237,7 +4299,7 @@
             <a:fld id="{15CF591B-FF43-4CF6-828F-71951A785747}" type="datetime1">
               <a:rPr lang="en-US" smtClean="0"/>
               <a:pPr/>
-              <a:t>2/22/2012</a:t>
+              <a:t>2/23/2012</a:t>
             </a:fld>
             <a:endParaRPr lang="en-US"/>
           </a:p>
@@ -4447,7 +4509,7 @@
             <a:fld id="{149CDA22-D52D-4407-B715-1A661539B3B4}" type="datetime1">
               <a:rPr lang="en-US" smtClean="0"/>
               <a:pPr/>
-              <a:t>2/22/2012</a:t>
+              <a:t>2/23/2012</a:t>
             </a:fld>
             <a:endParaRPr lang="en-US"/>
           </a:p>
@@ -4949,15 +5011,7 @@
           <a:p>
             <a:r>
               <a:rPr lang="en-US" sz="3200" dirty="0" smtClean="0"/>
-              <a:t>February </a:t>
-            </a:r>
-            <a:r>
-              <a:rPr lang="en-US" sz="3200" dirty="0" smtClean="0"/>
-              <a:t>23, </a:t>
-            </a:r>
-            <a:r>
-              <a:rPr lang="en-US" sz="3200" dirty="0" smtClean="0"/>
-              <a:t>2012</a:t>
+              <a:t>February 23, 2012</a:t>
             </a:r>
             <a:endParaRPr lang="en-US" sz="3200" dirty="0"/>
           </a:p>
@@ -5067,18 +5121,25 @@
           <a:p>
             <a:r>
               <a:rPr lang="en-US" dirty="0" smtClean="0"/>
-              <a:t>Android </a:t>
-            </a:r>
+              <a:t>Android development</a:t>
+            </a:r>
+          </a:p>
+          <a:p>
+            <a:pPr lvl="1"/>
             <a:r>
               <a:rPr lang="en-US" dirty="0" smtClean="0"/>
-              <a:t>development</a:t>
+              <a:t>Implemented initial capability providing control for 1 device from Android tablet</a:t>
             </a:r>
           </a:p>
           <a:p>
             <a:pPr lvl="1"/>
             <a:r>
               <a:rPr lang="en-US" dirty="0" smtClean="0"/>
-              <a:t>Began development on trend plotting tools</a:t>
+              <a:t>Began </a:t>
+            </a:r>
+            <a:r>
+              <a:rPr lang="en-US" dirty="0" smtClean="0"/>
+              <a:t>development on trend plotting tools</a:t>
             </a:r>
           </a:p>
           <a:p>
@@ -5095,18 +5156,12 @@
               <a:rPr lang="en-US" dirty="0" smtClean="0"/>
               <a:t> developer documentation</a:t>
             </a:r>
-            <a:endParaRPr lang="en-US" dirty="0" smtClean="0"/>
           </a:p>
           <a:p>
             <a:r>
               <a:rPr lang="en-US" dirty="0" smtClean="0"/>
-              <a:t>Project design </a:t>
-            </a:r>
-            <a:r>
-              <a:rPr lang="en-US" dirty="0" smtClean="0"/>
-              <a:t>discussions/documentation</a:t>
-            </a:r>
-            <a:endParaRPr lang="en-US" dirty="0" smtClean="0"/>
+              <a:t>Project design discussions/documentation</a:t>
+            </a:r>
           </a:p>
           <a:p>
             <a:pPr lvl="1"/>
@@ -5644,21 +5699,13 @@
       </p:graphicFrame>
       <p:graphicFrame>
         <p:nvGraphicFramePr>
-          <p:cNvPr id="6" name="Chart 5"/>
-          <p:cNvGraphicFramePr>
-            <a:graphicFrameLocks/>
-          </p:cNvGraphicFramePr>
-          <p:nvPr>
-            <p:extLst>
-              <p:ext uri="{D42A27DB-BD31-4B8C-83A1-F6EECF244321}">
-                <p14:modId xmlns:p14="http://schemas.microsoft.com/office/powerpoint/2010/main" xmlns="" val="949930518"/>
-              </p:ext>
-            </p:extLst>
-          </p:nvPr>
+          <p:cNvPr id="9" name="Chart 8"/>
+          <p:cNvGraphicFramePr/>
+          <p:nvPr/>
         </p:nvGraphicFramePr>
         <p:xfrm>
-          <a:off x="2514600" y="4572000"/>
-          <a:ext cx="3844925" cy="2041525"/>
+          <a:off x="2867025" y="4343400"/>
+          <a:ext cx="3409950" cy="2181225"/>
         </p:xfrm>
         <a:graphic>
           <a:graphicData uri="http://schemas.openxmlformats.org/drawingml/2006/chart">
@@ -5666,6 +5713,32 @@
           </a:graphicData>
         </a:graphic>
       </p:graphicFrame>
+      <p:pic>
+        <p:nvPicPr>
+          <p:cNvPr id="12" name="Picture 2" descr="C:\Users\DAVIS-CS\Desktop\Agile Suit Alex.jpg"/>
+          <p:cNvPicPr>
+            <a:picLocks noChangeAspect="1" noChangeArrowheads="1"/>
+          </p:cNvPicPr>
+          <p:nvPr/>
+        </p:nvPicPr>
+        <p:blipFill>
+          <a:blip r:embed="rId3" cstate="print"/>
+          <a:srcRect r="43922" b="76323"/>
+          <a:stretch>
+            <a:fillRect/>
+          </a:stretch>
+        </p:blipFill>
+        <p:spPr bwMode="auto">
+          <a:xfrm>
+            <a:off x="4800600" y="4419600"/>
+            <a:ext cx="205836" cy="228600"/>
+          </a:xfrm>
+          <a:prstGeom prst="rect">
+            <a:avLst/>
+          </a:prstGeom>
+          <a:noFill/>
+        </p:spPr>
+      </p:pic>
     </p:spTree>
   </p:cSld>
   <p:clrMapOvr>
@@ -5858,14 +5931,14 @@
                       <a:r>
                         <a:rPr lang="en-US" dirty="0" smtClean="0">
                           <a:solidFill>
-                            <a:srgbClr val="FF0000"/>
+                            <a:schemeClr val="tx1"/>
                           </a:solidFill>
                         </a:rPr>
                         <a:t>SLOC (Physical)</a:t>
                       </a:r>
                       <a:endParaRPr lang="en-US" dirty="0">
                         <a:solidFill>
-                          <a:srgbClr val="FF0000"/>
+                          <a:schemeClr val="tx1"/>
                         </a:solidFill>
                       </a:endParaRPr>
                     </a:p>
@@ -5880,7 +5953,7 @@
                       <a:r>
                         <a:rPr lang="en-US" sz="1800" kern="1200" dirty="0" smtClean="0">
                           <a:solidFill>
-                            <a:srgbClr val="FF0000"/>
+                            <a:schemeClr val="tx1"/>
                           </a:solidFill>
                           <a:latin typeface="+mn-lt"/>
                           <a:ea typeface="+mn-ea"/>
@@ -5890,7 +5963,7 @@
                       </a:r>
                       <a:endParaRPr lang="en-US" dirty="0">
                         <a:solidFill>
-                          <a:srgbClr val="FF0000"/>
+                          <a:schemeClr val="tx1"/>
                         </a:solidFill>
                       </a:endParaRPr>
                     </a:p>
@@ -5904,7 +5977,7 @@
                     <a:p>
                       <a:endParaRPr lang="en-US" dirty="0">
                         <a:solidFill>
-                          <a:srgbClr val="FF0000"/>
+                          <a:schemeClr val="tx1"/>
                         </a:solidFill>
                       </a:endParaRPr>
                     </a:p>
@@ -5938,7 +6011,7 @@
                       <a:r>
                         <a:rPr lang="en-US" dirty="0" smtClean="0">
                           <a:solidFill>
-                            <a:srgbClr val="FF0000"/>
+                            <a:schemeClr val="tx1"/>
                           </a:solidFill>
                         </a:rPr>
                         <a:t>SLOC (Logical)</a:t>
@@ -5955,7 +6028,7 @@
                       <a:r>
                         <a:rPr lang="en-US" sz="1800" kern="1200" dirty="0" smtClean="0">
                           <a:solidFill>
-                            <a:srgbClr val="FF0000"/>
+                            <a:schemeClr val="tx1"/>
                           </a:solidFill>
                           <a:latin typeface="+mn-lt"/>
                           <a:ea typeface="+mn-ea"/>
@@ -5974,7 +6047,7 @@
                     <a:p>
                       <a:endParaRPr lang="en-US" dirty="0">
                         <a:solidFill>
-                          <a:srgbClr val="FF0000"/>
+                          <a:schemeClr val="tx1"/>
                         </a:solidFill>
                       </a:endParaRPr>
                     </a:p>
@@ -6116,21 +6189,13 @@
       </p:graphicFrame>
       <p:graphicFrame>
         <p:nvGraphicFramePr>
-          <p:cNvPr id="9" name="Chart 8"/>
-          <p:cNvGraphicFramePr>
-            <a:graphicFrameLocks/>
-          </p:cNvGraphicFramePr>
-          <p:nvPr>
-            <p:extLst>
-              <p:ext uri="{D42A27DB-BD31-4B8C-83A1-F6EECF244321}">
-                <p14:modId xmlns:p14="http://schemas.microsoft.com/office/powerpoint/2010/main" xmlns="" val="1183283081"/>
-              </p:ext>
-            </p:extLst>
-          </p:nvPr>
+          <p:cNvPr id="8" name="Chart 7"/>
+          <p:cNvGraphicFramePr/>
+          <p:nvPr/>
         </p:nvGraphicFramePr>
         <p:xfrm>
-          <a:off x="762000" y="3962400"/>
-          <a:ext cx="3790950" cy="2028826"/>
+          <a:off x="838200" y="3962400"/>
+          <a:ext cx="3505200" cy="2181226"/>
         </p:xfrm>
         <a:graphic>
           <a:graphicData uri="http://schemas.openxmlformats.org/drawingml/2006/chart">
@@ -6140,21 +6205,13 @@
       </p:graphicFrame>
       <p:graphicFrame>
         <p:nvGraphicFramePr>
-          <p:cNvPr id="13" name="Chart 12"/>
-          <p:cNvGraphicFramePr>
-            <a:graphicFrameLocks/>
-          </p:cNvGraphicFramePr>
-          <p:nvPr>
-            <p:extLst>
-              <p:ext uri="{D42A27DB-BD31-4B8C-83A1-F6EECF244321}">
-                <p14:modId xmlns:p14="http://schemas.microsoft.com/office/powerpoint/2010/main" xmlns="" val="4187385866"/>
-              </p:ext>
-            </p:extLst>
-          </p:nvPr>
+          <p:cNvPr id="10" name="Chart 9"/>
+          <p:cNvGraphicFramePr/>
+          <p:nvPr/>
         </p:nvGraphicFramePr>
         <p:xfrm>
-          <a:off x="4800600" y="3962400"/>
-          <a:ext cx="3790950" cy="2028825"/>
+          <a:off x="4800600" y="3886200"/>
+          <a:ext cx="3524250" cy="2181225"/>
         </p:xfrm>
         <a:graphic>
           <a:graphicData uri="http://schemas.openxmlformats.org/drawingml/2006/chart">
@@ -6429,14 +6486,14 @@
                       <a:r>
                         <a:rPr lang="en-US" dirty="0" smtClean="0">
                           <a:solidFill>
-                            <a:schemeClr val="tx1"/>
+                            <a:srgbClr val="FF0000"/>
                           </a:solidFill>
                         </a:rPr>
                         <a:t># Control Elements Prototyped</a:t>
                       </a:r>
                       <a:endParaRPr lang="en-US" dirty="0">
                         <a:solidFill>
-                          <a:schemeClr val="tx1"/>
+                          <a:srgbClr val="FF0000"/>
                         </a:solidFill>
                       </a:endParaRPr>
                     </a:p>
@@ -6451,14 +6508,14 @@
                       <a:r>
                         <a:rPr lang="en-US" dirty="0" smtClean="0">
                           <a:solidFill>
-                            <a:schemeClr val="tx1"/>
+                            <a:srgbClr val="FF0000"/>
                           </a:solidFill>
                         </a:rPr>
-                        <a:t>1</a:t>
+                        <a:t>2</a:t>
                       </a:r>
                       <a:endParaRPr lang="en-US" dirty="0">
                         <a:solidFill>
-                          <a:schemeClr val="tx1"/>
+                          <a:srgbClr val="FF0000"/>
                         </a:solidFill>
                       </a:endParaRPr>
                     </a:p>
@@ -6490,11 +6547,24 @@
                       <a:r>
                         <a:rPr lang="en-US" dirty="0" smtClean="0">
                           <a:solidFill>
-                            <a:schemeClr val="tx1"/>
+                            <a:srgbClr val="FF0000"/>
                           </a:solidFill>
                         </a:rPr>
-                        <a:t>Motor Control</a:t>
+                        <a:t>Motor </a:t>
                       </a:r>
+                      <a:r>
+                        <a:rPr lang="en-US" dirty="0" smtClean="0">
+                          <a:solidFill>
+                            <a:srgbClr val="FF0000"/>
+                          </a:solidFill>
+                        </a:rPr>
+                        <a:t>Control, LED</a:t>
+                      </a:r>
+                      <a:endParaRPr lang="en-US" dirty="0" smtClean="0">
+                        <a:solidFill>
+                          <a:srgbClr val="FF0000"/>
+                        </a:solidFill>
+                      </a:endParaRPr>
                     </a:p>
                   </a:txBody>
                   <a:tcPr/>
@@ -6713,21 +6783,13 @@
       </p:graphicFrame>
       <p:graphicFrame>
         <p:nvGraphicFramePr>
-          <p:cNvPr id="7" name="Chart 6"/>
-          <p:cNvGraphicFramePr>
-            <a:graphicFrameLocks/>
-          </p:cNvGraphicFramePr>
-          <p:nvPr>
-            <p:extLst>
-              <p:ext uri="{D42A27DB-BD31-4B8C-83A1-F6EECF244321}">
-                <p14:modId xmlns:p14="http://schemas.microsoft.com/office/powerpoint/2010/main" xmlns="" val="408764671"/>
-              </p:ext>
-            </p:extLst>
-          </p:nvPr>
+          <p:cNvPr id="6" name="Chart 5"/>
+          <p:cNvGraphicFramePr/>
+          <p:nvPr/>
         </p:nvGraphicFramePr>
         <p:xfrm>
-          <a:off x="2667000" y="4343400"/>
-          <a:ext cx="3863975" cy="2028825"/>
+          <a:off x="2857500" y="4267200"/>
+          <a:ext cx="3429000" cy="2181225"/>
         </p:xfrm>
         <a:graphic>
           <a:graphicData uri="http://schemas.openxmlformats.org/drawingml/2006/chart">
@@ -6751,6 +6813,154 @@
 </file>
 
 <file path=ppt/slides/slide6.xml><?xml version="1.0" encoding="utf-8"?>
+<p:sld xmlns:a="http://schemas.openxmlformats.org/drawingml/2006/main" xmlns:r="http://schemas.openxmlformats.org/officeDocument/2006/relationships" xmlns:p="http://schemas.openxmlformats.org/presentationml/2006/main">
+  <p:cSld>
+    <p:spTree>
+      <p:nvGrpSpPr>
+        <p:cNvPr id="1" name=""/>
+        <p:cNvGrpSpPr/>
+        <p:nvPr/>
+      </p:nvGrpSpPr>
+      <p:grpSpPr>
+        <a:xfrm>
+          <a:off x="0" y="0"/>
+          <a:ext cx="0" cy="0"/>
+          <a:chOff x="0" y="0"/>
+          <a:chExt cx="0" cy="0"/>
+        </a:xfrm>
+      </p:grpSpPr>
+      <p:sp>
+        <p:nvSpPr>
+          <p:cNvPr id="2" name="Title 1"/>
+          <p:cNvSpPr>
+            <a:spLocks noGrp="1"/>
+          </p:cNvSpPr>
+          <p:nvPr>
+            <p:ph type="title"/>
+          </p:nvPr>
+        </p:nvSpPr>
+        <p:spPr/>
+        <p:txBody>
+          <a:bodyPr>
+            <a:normAutofit/>
+          </a:bodyPr>
+          <a:lstStyle/>
+          <a:p>
+            <a:r>
+              <a:rPr lang="en-US" dirty="0" err="1" smtClean="0"/>
+              <a:t>Arduino</a:t>
+            </a:r>
+            <a:r>
+              <a:rPr lang="en-US" dirty="0" smtClean="0"/>
+              <a:t> Communication Interface</a:t>
+            </a:r>
+            <a:endParaRPr lang="en-US" dirty="0"/>
+          </a:p>
+        </p:txBody>
+      </p:sp>
+      <p:sp>
+        <p:nvSpPr>
+          <p:cNvPr id="3" name="Content Placeholder 2"/>
+          <p:cNvSpPr>
+            <a:spLocks noGrp="1"/>
+          </p:cNvSpPr>
+          <p:nvPr>
+            <p:ph idx="1"/>
+          </p:nvPr>
+        </p:nvSpPr>
+        <p:spPr/>
+        <p:txBody>
+          <a:bodyPr/>
+          <a:lstStyle/>
+          <a:p>
+            <a:r>
+              <a:rPr lang="en-US" u="sng" dirty="0" smtClean="0">
+                <a:hlinkClick r:id="rId2"/>
+              </a:rPr>
+              <a:t>http://</a:t>
+            </a:r>
+            <a:r>
+              <a:rPr lang="en-US" u="sng" dirty="0" smtClean="0">
+                <a:hlinkClick r:id="rId2"/>
+              </a:rPr>
+              <a:t>youtu.be/xGlastBgfSE</a:t>
+            </a:r>
+            <a:endParaRPr lang="en-US" u="sng" dirty="0" smtClean="0"/>
+          </a:p>
+          <a:p>
+            <a:r>
+              <a:rPr lang="en-US" dirty="0" smtClean="0"/>
+              <a:t>LED is controlled by Android tablet using Wi-Fi and the HTTP-based communication interface we developed</a:t>
+            </a:r>
+          </a:p>
+        </p:txBody>
+      </p:sp>
+      <p:sp>
+        <p:nvSpPr>
+          <p:cNvPr id="4" name="Slide Number Placeholder 3"/>
+          <p:cNvSpPr>
+            <a:spLocks noGrp="1"/>
+          </p:cNvSpPr>
+          <p:nvPr>
+            <p:ph type="sldNum" sz="quarter" idx="12"/>
+          </p:nvPr>
+        </p:nvSpPr>
+        <p:spPr/>
+        <p:txBody>
+          <a:bodyPr/>
+          <a:lstStyle/>
+          <a:p>
+            <a:fld id="{2F5F0D6A-11AB-4DFD-AEC9-4019EB08637C}" type="slidenum">
+              <a:rPr lang="en-US" smtClean="0"/>
+              <a:pPr/>
+              <a:t>6</a:t>
+            </a:fld>
+            <a:endParaRPr lang="en-US"/>
+          </a:p>
+        </p:txBody>
+      </p:sp>
+      <p:pic>
+        <p:nvPicPr>
+          <p:cNvPr id="5" name="Picture 2" descr="C:\Users\DAVIS-CS\Desktop\Agile Suit Alex.jpg"/>
+          <p:cNvPicPr>
+            <a:picLocks noChangeAspect="1" noChangeArrowheads="1"/>
+          </p:cNvPicPr>
+          <p:nvPr/>
+        </p:nvPicPr>
+        <p:blipFill>
+          <a:blip r:embed="rId3" cstate="print"/>
+          <a:srcRect r="43922" b="76323"/>
+          <a:stretch>
+            <a:fillRect/>
+          </a:stretch>
+        </p:blipFill>
+        <p:spPr bwMode="auto">
+          <a:xfrm rot="5400000">
+            <a:off x="31002" y="5893316"/>
+            <a:ext cx="909698" cy="1010306"/>
+          </a:xfrm>
+          <a:prstGeom prst="rect">
+            <a:avLst/>
+          </a:prstGeom>
+          <a:noFill/>
+        </p:spPr>
+      </p:pic>
+    </p:spTree>
+  </p:cSld>
+  <p:clrMapOvr>
+    <a:masterClrMapping/>
+  </p:clrMapOvr>
+  <p:timing>
+    <p:tnLst>
+      <p:par>
+        <p:cTn id="1" dur="indefinite" restart="never" nodeType="tmRoot"/>
+      </p:par>
+    </p:tnLst>
+  </p:timing>
+</p:sld>
+</file>
+
+<file path=ppt/slides/slide7.xml><?xml version="1.0" encoding="utf-8"?>
 <p:sld xmlns:a="http://schemas.openxmlformats.org/drawingml/2006/main" xmlns:r="http://schemas.openxmlformats.org/officeDocument/2006/relationships" xmlns:p="http://schemas.openxmlformats.org/presentationml/2006/main">
   <p:cSld>
     <p:spTree>
@@ -6925,7 +7135,7 @@
             <a:fld id="{2F5F0D6A-11AB-4DFD-AEC9-4019EB08637C}" type="slidenum">
               <a:rPr lang="en-US" smtClean="0"/>
               <a:pPr/>
-              <a:t>6</a:t>
+              <a:t>7</a:t>
             </a:fld>
             <a:endParaRPr lang="en-US"/>
           </a:p>

</xml_diff>